<commit_message>
Updated Cookbook Style and Correctness (Module 7)
* Removed all the lesson objectives that are now in the other modules
</commit_message>
<xml_diff>
--- a/Modules/07-cookbook_style_and_correctness.pptx
+++ b/Modules/07-cookbook_style_and_correctness.pptx
@@ -117,7 +117,7 @@
   </p:defaultTextStyle>
   <p:extLst>
     <p:ext uri="{EFAFB233-063F-42B5-8137-9DF3F51BA10A}">
-      <p15:sldGuideLst xmlns:p15="http://schemas.microsoft.com/office/powerpoint/2012/main">
+      <p15:sldGuideLst xmlns:p15="http://schemas.microsoft.com/office/powerpoint/2012/main" xmlns="">
         <p15:guide id="1" orient="horz" pos="2880">
           <p15:clr>
             <a:srgbClr val="A4A3A4"/>
@@ -216,7 +216,7 @@
           <a:p>
             <a:fld id="{D269065F-C4EF-4A64-8A89-E6292D2A811F}" type="datetimeFigureOut">
               <a:rPr lang="en-US" smtClean="0"/>
-              <a:t>7/7/2015</a:t>
+              <a:t>7/8/15</a:t>
             </a:fld>
             <a:endParaRPr lang="en-US"/>
           </a:p>
@@ -707,7 +707,7 @@
           <a:p>
             <a:fld id="{1D8BD707-D9CF-40AE-B4C6-C98DA3205C09}" type="datetimeFigureOut">
               <a:rPr lang="en-US"/>
-              <a:t>7/7/2015</a:t>
+              <a:t>7/8/15</a:t>
             </a:fld>
             <a:endParaRPr lang="en-US"/>
           </a:p>
@@ -890,7 +890,7 @@
           <a:p>
             <a:fld id="{1D8BD707-D9CF-40AE-B4C6-C98DA3205C09}" type="datetimeFigureOut">
               <a:rPr lang="en-US"/>
-              <a:t>7/7/2015</a:t>
+              <a:t>7/8/15</a:t>
             </a:fld>
             <a:endParaRPr lang="en-US"/>
           </a:p>
@@ -4263,7 +4263,7 @@
           <a:p>
             <a:fld id="{1D8BD707-D9CF-40AE-B4C6-C98DA3205C09}" type="datetimeFigureOut">
               <a:rPr lang="en-US"/>
-              <a:t>7/7/2015</a:t>
+              <a:t>7/8/15</a:t>
             </a:fld>
             <a:endParaRPr lang="en-US"/>
           </a:p>
@@ -4417,7 +4417,7 @@
           <a:p>
             <a:fld id="{1D8BD707-D9CF-40AE-B4C6-C98DA3205C09}" type="datetimeFigureOut">
               <a:rPr lang="en-US"/>
-              <a:t>7/7/2015</a:t>
+              <a:t>7/8/15</a:t>
             </a:fld>
             <a:endParaRPr lang="en-US"/>
           </a:p>
@@ -7590,7 +7590,7 @@
           <a:p>
             <a:fld id="{1D8BD707-D9CF-40AE-B4C6-C98DA3205C09}" type="datetimeFigureOut">
               <a:rPr lang="en-US"/>
-              <a:t>7/7/2015</a:t>
+              <a:t>7/8/15</a:t>
             </a:fld>
             <a:endParaRPr lang="en-US"/>
           </a:p>
@@ -7871,7 +7871,7 @@
           <a:p>
             <a:fld id="{1D8BD707-D9CF-40AE-B4C6-C98DA3205C09}" type="datetimeFigureOut">
               <a:rPr lang="en-US"/>
-              <a:t>7/7/2015</a:t>
+              <a:t>7/8/15</a:t>
             </a:fld>
             <a:endParaRPr lang="en-US"/>
           </a:p>
@@ -17666,7 +17666,7 @@
         <p:spPr>
           <a:xfrm>
             <a:off x="787400" y="1935330"/>
-            <a:ext cx="14669135" cy="5996940"/>
+            <a:ext cx="14669135" cy="3080202"/>
           </a:xfrm>
           <a:prstGeom prst="rect">
             <a:avLst/>
@@ -17907,10 +17907,6 @@
               </a:rPr>
               <a:t>:</a:t>
             </a:r>
-            <a:endParaRPr sz="4600">
-              <a:latin typeface="Arial"/>
-              <a:cs typeface="Arial"/>
-            </a:endParaRPr>
           </a:p>
           <a:p>
             <a:pPr marL="797560" marR="1144270" lvl="1" indent="-365760">
@@ -18124,10 +18120,6 @@
               </a:rPr>
               <a:t>ks</a:t>
             </a:r>
-            <a:endParaRPr sz="4600">
-              <a:latin typeface="Arial"/>
-              <a:cs typeface="Arial"/>
-            </a:endParaRPr>
           </a:p>
           <a:p>
             <a:pPr marL="797560" lvl="1" indent="-365760">
@@ -18283,485 +18275,65 @@
                 <a:latin typeface="Arial"/>
                 <a:cs typeface="Arial"/>
               </a:rPr>
-              <a:t>st yo</a:t>
-            </a:r>
-            <a:r>
-              <a:rPr sz="4600" spc="5" dirty="0">
+              <a:t>st </a:t>
+            </a:r>
+            <a:r>
+              <a:rPr sz="4600">
+                <a:latin typeface="Arial"/>
+                <a:cs typeface="Arial"/>
+              </a:rPr>
+              <a:t>yo</a:t>
+            </a:r>
+            <a:r>
+              <a:rPr sz="4600" spc="5">
                 <a:latin typeface="Arial"/>
                 <a:cs typeface="Arial"/>
               </a:rPr>
               <a:t>u</a:t>
             </a:r>
             <a:r>
-              <a:rPr sz="4600" dirty="0">
-                <a:latin typeface="Arial"/>
-                <a:cs typeface="Arial"/>
-              </a:rPr>
-              <a:t>r co</a:t>
-            </a:r>
-            <a:r>
-              <a:rPr sz="4600" spc="5" dirty="0">
+              <a:rPr sz="4600">
+                <a:latin typeface="Arial"/>
+                <a:cs typeface="Arial"/>
+              </a:rPr>
+              <a:t>r </a:t>
+            </a:r>
+            <a:r>
+              <a:rPr sz="4600" smtClean="0">
+                <a:latin typeface="Arial"/>
+                <a:cs typeface="Arial"/>
+              </a:rPr>
+              <a:t>co</a:t>
+            </a:r>
+            <a:r>
+              <a:rPr sz="4600" spc="5" smtClean="0">
                 <a:latin typeface="Arial"/>
                 <a:cs typeface="Arial"/>
               </a:rPr>
               <a:t>o</a:t>
             </a:r>
             <a:r>
-              <a:rPr sz="4600" dirty="0">
+              <a:rPr sz="4600" smtClean="0">
                 <a:latin typeface="Arial"/>
                 <a:cs typeface="Arial"/>
               </a:rPr>
               <a:t>kb</a:t>
             </a:r>
             <a:r>
-              <a:rPr sz="4600" spc="5" dirty="0">
+              <a:rPr sz="4600" spc="5" smtClean="0">
                 <a:latin typeface="Arial"/>
                 <a:cs typeface="Arial"/>
               </a:rPr>
               <a:t>oo</a:t>
             </a:r>
             <a:r>
-              <a:rPr sz="4600" dirty="0">
+              <a:rPr sz="4600" smtClean="0">
                 <a:latin typeface="Arial"/>
                 <a:cs typeface="Arial"/>
               </a:rPr>
               <a:t>ks</a:t>
             </a:r>
-            <a:endParaRPr sz="4600">
-              <a:latin typeface="Arial"/>
-              <a:cs typeface="Arial"/>
-            </a:endParaRPr>
-          </a:p>
-          <a:p>
-            <a:pPr marL="797560" marR="2902585" lvl="1" indent="-365760">
-              <a:lnSpc>
-                <a:spcPts val="5400"/>
-              </a:lnSpc>
-              <a:spcBef>
-                <a:spcPts val="1310"/>
-              </a:spcBef>
-              <a:buClr>
-                <a:srgbClr val="F38C24"/>
-              </a:buClr>
-              <a:buChar char="•"/>
-              <a:tabLst>
-                <a:tab pos="797560" algn="l"/>
-              </a:tabLst>
-            </a:pPr>
-            <a:r>
-              <a:rPr sz="4600" spc="5" dirty="0">
-                <a:latin typeface="Arial"/>
-                <a:cs typeface="Arial"/>
-              </a:rPr>
-              <a:t>Use</a:t>
-            </a:r>
-            <a:r>
-              <a:rPr sz="4600" dirty="0">
-                <a:latin typeface="Arial"/>
-                <a:cs typeface="Arial"/>
-              </a:rPr>
-              <a:t> </a:t>
-            </a:r>
-            <a:r>
-              <a:rPr sz="4600" spc="-5" dirty="0">
-                <a:latin typeface="Arial"/>
-                <a:cs typeface="Arial"/>
-              </a:rPr>
-              <a:t>F</a:t>
-            </a:r>
-            <a:r>
-              <a:rPr sz="4600" spc="5" dirty="0">
-                <a:latin typeface="Arial"/>
-                <a:cs typeface="Arial"/>
-              </a:rPr>
-              <a:t>ood</a:t>
-            </a:r>
-            <a:r>
-              <a:rPr sz="4600" dirty="0">
-                <a:latin typeface="Arial"/>
-                <a:cs typeface="Arial"/>
-              </a:rPr>
-              <a:t>cri</a:t>
-            </a:r>
-            <a:r>
-              <a:rPr sz="4600" spc="-5" dirty="0">
-                <a:latin typeface="Arial"/>
-                <a:cs typeface="Arial"/>
-              </a:rPr>
-              <a:t>t</a:t>
-            </a:r>
-            <a:r>
-              <a:rPr sz="4600" dirty="0">
-                <a:latin typeface="Arial"/>
-                <a:cs typeface="Arial"/>
-              </a:rPr>
-              <a:t>ic </a:t>
-            </a:r>
-            <a:r>
-              <a:rPr sz="4600" spc="-5" dirty="0">
-                <a:latin typeface="Arial"/>
-                <a:cs typeface="Arial"/>
-              </a:rPr>
-              <a:t>t</a:t>
-            </a:r>
-            <a:r>
-              <a:rPr sz="4600" spc="5" dirty="0">
-                <a:latin typeface="Arial"/>
-                <a:cs typeface="Arial"/>
-              </a:rPr>
-              <a:t>o</a:t>
-            </a:r>
-            <a:r>
-              <a:rPr sz="4600" dirty="0">
-                <a:latin typeface="Arial"/>
-                <a:cs typeface="Arial"/>
-              </a:rPr>
-              <a:t> ch</a:t>
-            </a:r>
-            <a:r>
-              <a:rPr sz="4600" spc="5" dirty="0">
-                <a:latin typeface="Arial"/>
-                <a:cs typeface="Arial"/>
-              </a:rPr>
-              <a:t>e</a:t>
-            </a:r>
-            <a:r>
-              <a:rPr sz="4600" dirty="0">
-                <a:latin typeface="Arial"/>
-                <a:cs typeface="Arial"/>
-              </a:rPr>
-              <a:t>ck </a:t>
-            </a:r>
-            <a:r>
-              <a:rPr sz="4600" spc="-5" dirty="0">
-                <a:latin typeface="Arial"/>
-                <a:cs typeface="Arial"/>
-              </a:rPr>
-              <a:t>t</a:t>
-            </a:r>
-            <a:r>
-              <a:rPr sz="4600" spc="5" dirty="0">
-                <a:latin typeface="Arial"/>
-                <a:cs typeface="Arial"/>
-              </a:rPr>
-              <a:t>he</a:t>
-            </a:r>
-            <a:r>
-              <a:rPr sz="4600" dirty="0">
-                <a:latin typeface="Arial"/>
-                <a:cs typeface="Arial"/>
-              </a:rPr>
-              <a:t> vali</a:t>
-            </a:r>
-            <a:r>
-              <a:rPr sz="4600" spc="5" dirty="0">
-                <a:latin typeface="Arial"/>
-                <a:cs typeface="Arial"/>
-              </a:rPr>
-              <a:t>d</a:t>
-            </a:r>
-            <a:r>
-              <a:rPr sz="4600" dirty="0">
-                <a:latin typeface="Arial"/>
-                <a:cs typeface="Arial"/>
-              </a:rPr>
-              <a:t>i</a:t>
-            </a:r>
-            <a:r>
-              <a:rPr sz="4600" spc="-5" dirty="0">
-                <a:latin typeface="Arial"/>
-                <a:cs typeface="Arial"/>
-              </a:rPr>
-              <a:t>t</a:t>
-            </a:r>
-            <a:r>
-              <a:rPr sz="4600" dirty="0">
-                <a:latin typeface="Arial"/>
-                <a:cs typeface="Arial"/>
-              </a:rPr>
-              <a:t>y </a:t>
-            </a:r>
-            <a:r>
-              <a:rPr sz="4600" spc="5" dirty="0">
-                <a:latin typeface="Arial"/>
-                <a:cs typeface="Arial"/>
-              </a:rPr>
-              <a:t>o</a:t>
-            </a:r>
-            <a:r>
-              <a:rPr sz="4600" dirty="0">
-                <a:latin typeface="Arial"/>
-                <a:cs typeface="Arial"/>
-              </a:rPr>
-              <a:t>f yo</a:t>
-            </a:r>
-            <a:r>
-              <a:rPr sz="4600" spc="5" dirty="0">
-                <a:latin typeface="Arial"/>
-                <a:cs typeface="Arial"/>
-              </a:rPr>
-              <a:t>u</a:t>
-            </a:r>
-            <a:r>
-              <a:rPr sz="4600" dirty="0">
-                <a:latin typeface="Arial"/>
-                <a:cs typeface="Arial"/>
-              </a:rPr>
-              <a:t>r co</a:t>
-            </a:r>
-            <a:r>
-              <a:rPr sz="4600" spc="5" dirty="0">
-                <a:latin typeface="Arial"/>
-                <a:cs typeface="Arial"/>
-              </a:rPr>
-              <a:t>o</a:t>
-            </a:r>
-            <a:r>
-              <a:rPr sz="4600" dirty="0">
-                <a:latin typeface="Arial"/>
-                <a:cs typeface="Arial"/>
-              </a:rPr>
-              <a:t>kb</a:t>
-            </a:r>
-            <a:r>
-              <a:rPr sz="4600" spc="5" dirty="0">
-                <a:latin typeface="Arial"/>
-                <a:cs typeface="Arial"/>
-              </a:rPr>
-              <a:t>oo</a:t>
-            </a:r>
-            <a:r>
-              <a:rPr sz="4600" dirty="0">
-                <a:latin typeface="Arial"/>
-                <a:cs typeface="Arial"/>
-              </a:rPr>
-              <a:t>ks</a:t>
-            </a:r>
-            <a:endParaRPr sz="4600">
-              <a:latin typeface="Arial"/>
-              <a:cs typeface="Arial"/>
-            </a:endParaRPr>
-          </a:p>
-          <a:p>
-            <a:pPr marL="797560" marR="1242060" lvl="1" indent="-365760">
-              <a:lnSpc>
-                <a:spcPts val="5400"/>
-              </a:lnSpc>
-              <a:spcBef>
-                <a:spcPts val="1150"/>
-              </a:spcBef>
-              <a:buClr>
-                <a:srgbClr val="F38C24"/>
-              </a:buClr>
-              <a:buChar char="•"/>
-              <a:tabLst>
-                <a:tab pos="797560" algn="l"/>
-              </a:tabLst>
-            </a:pPr>
-            <a:r>
-              <a:rPr sz="4600" spc="-250" dirty="0">
-                <a:latin typeface="Arial"/>
-                <a:cs typeface="Arial"/>
-              </a:rPr>
-              <a:t>V</a:t>
-            </a:r>
-            <a:r>
-              <a:rPr sz="4600" dirty="0">
-                <a:latin typeface="Arial"/>
-                <a:cs typeface="Arial"/>
-              </a:rPr>
-              <a:t>eri</a:t>
-            </a:r>
-            <a:r>
-              <a:rPr sz="4600" spc="-5" dirty="0">
-                <a:latin typeface="Arial"/>
-                <a:cs typeface="Arial"/>
-              </a:rPr>
-              <a:t>f</a:t>
-            </a:r>
-            <a:r>
-              <a:rPr sz="4600" dirty="0">
-                <a:latin typeface="Arial"/>
-                <a:cs typeface="Arial"/>
-              </a:rPr>
-              <a:t>y yo</a:t>
-            </a:r>
-            <a:r>
-              <a:rPr sz="4600" spc="5" dirty="0">
-                <a:latin typeface="Arial"/>
-                <a:cs typeface="Arial"/>
-              </a:rPr>
-              <a:t>u</a:t>
-            </a:r>
-            <a:r>
-              <a:rPr sz="4600" dirty="0">
-                <a:latin typeface="Arial"/>
-                <a:cs typeface="Arial"/>
-              </a:rPr>
-              <a:t>r co</a:t>
-            </a:r>
-            <a:r>
-              <a:rPr sz="4600" spc="5" dirty="0">
-                <a:latin typeface="Arial"/>
-                <a:cs typeface="Arial"/>
-              </a:rPr>
-              <a:t>de</a:t>
-            </a:r>
-            <a:r>
-              <a:rPr sz="4600" dirty="0">
-                <a:latin typeface="Arial"/>
-                <a:cs typeface="Arial"/>
-              </a:rPr>
-              <a:t> adheres </a:t>
-            </a:r>
-            <a:r>
-              <a:rPr sz="4600" spc="-5" dirty="0">
-                <a:latin typeface="Arial"/>
-                <a:cs typeface="Arial"/>
-              </a:rPr>
-              <a:t>t</a:t>
-            </a:r>
-            <a:r>
-              <a:rPr sz="4600" spc="5" dirty="0">
-                <a:latin typeface="Arial"/>
-                <a:cs typeface="Arial"/>
-              </a:rPr>
-              <a:t>o</a:t>
-            </a:r>
-            <a:r>
-              <a:rPr sz="4600" dirty="0">
-                <a:latin typeface="Arial"/>
-                <a:cs typeface="Arial"/>
-              </a:rPr>
-              <a:t> </a:t>
-            </a:r>
-            <a:r>
-              <a:rPr sz="4600" spc="-5" dirty="0">
-                <a:latin typeface="Arial"/>
-                <a:cs typeface="Arial"/>
-              </a:rPr>
-              <a:t>t</a:t>
-            </a:r>
-            <a:r>
-              <a:rPr sz="4600" spc="5" dirty="0">
-                <a:latin typeface="Arial"/>
-                <a:cs typeface="Arial"/>
-              </a:rPr>
-              <a:t>he</a:t>
-            </a:r>
-            <a:r>
-              <a:rPr sz="4600" dirty="0">
-                <a:latin typeface="Arial"/>
-                <a:cs typeface="Arial"/>
-              </a:rPr>
-              <a:t> </a:t>
-            </a:r>
-            <a:r>
-              <a:rPr sz="4600" spc="5" dirty="0">
-                <a:latin typeface="Arial"/>
-                <a:cs typeface="Arial"/>
-              </a:rPr>
-              <a:t>commun</a:t>
-            </a:r>
-            <a:r>
-              <a:rPr sz="4600" dirty="0">
-                <a:latin typeface="Arial"/>
-                <a:cs typeface="Arial"/>
-              </a:rPr>
-              <a:t>i</a:t>
-            </a:r>
-            <a:r>
-              <a:rPr sz="4600" spc="-5" dirty="0">
-                <a:latin typeface="Arial"/>
-                <a:cs typeface="Arial"/>
-              </a:rPr>
-              <a:t>t</a:t>
-            </a:r>
-            <a:r>
-              <a:rPr sz="4600" dirty="0">
-                <a:latin typeface="Arial"/>
-                <a:cs typeface="Arial"/>
-              </a:rPr>
-              <a:t>y </a:t>
-            </a:r>
-            <a:r>
-              <a:rPr sz="4600" spc="5" dirty="0">
-                <a:latin typeface="Arial"/>
-                <a:cs typeface="Arial"/>
-              </a:rPr>
-              <a:t>Rub</a:t>
-            </a:r>
-            <a:r>
-              <a:rPr sz="4600" dirty="0">
-                <a:latin typeface="Arial"/>
-                <a:cs typeface="Arial"/>
-              </a:rPr>
-              <a:t>y s</a:t>
-            </a:r>
-            <a:r>
-              <a:rPr sz="4600" spc="-5" dirty="0">
-                <a:latin typeface="Arial"/>
-                <a:cs typeface="Arial"/>
-              </a:rPr>
-              <a:t>t</a:t>
-            </a:r>
-            <a:r>
-              <a:rPr sz="4600" dirty="0">
-                <a:latin typeface="Arial"/>
-                <a:cs typeface="Arial"/>
-              </a:rPr>
-              <a:t>yle </a:t>
-            </a:r>
-            <a:r>
-              <a:rPr sz="4600" spc="5" dirty="0">
-                <a:latin typeface="Arial"/>
-                <a:cs typeface="Arial"/>
-              </a:rPr>
-              <a:t>gu</a:t>
-            </a:r>
-            <a:r>
-              <a:rPr sz="4600" dirty="0">
-                <a:latin typeface="Arial"/>
-                <a:cs typeface="Arial"/>
-              </a:rPr>
-              <a:t>i</a:t>
-            </a:r>
-            <a:r>
-              <a:rPr sz="4600" spc="5" dirty="0">
-                <a:latin typeface="Arial"/>
-                <a:cs typeface="Arial"/>
-              </a:rPr>
-              <a:t>de</a:t>
-            </a:r>
-            <a:r>
-              <a:rPr sz="4600" dirty="0">
-                <a:latin typeface="Arial"/>
-                <a:cs typeface="Arial"/>
-              </a:rPr>
-              <a:t> </a:t>
-            </a:r>
-            <a:r>
-              <a:rPr sz="4600" spc="5" dirty="0">
-                <a:latin typeface="Arial"/>
-                <a:cs typeface="Arial"/>
-              </a:rPr>
-              <a:t>b</a:t>
-            </a:r>
-            <a:r>
-              <a:rPr sz="4600" dirty="0">
-                <a:latin typeface="Arial"/>
-                <a:cs typeface="Arial"/>
-              </a:rPr>
-              <a:t>y using </a:t>
-            </a:r>
-            <a:r>
-              <a:rPr sz="4600" spc="5" dirty="0">
-                <a:latin typeface="Arial"/>
-                <a:cs typeface="Arial"/>
-              </a:rPr>
-              <a:t>Rubocop</a:t>
-            </a:r>
-            <a:endParaRPr sz="4600">
+            <a:endParaRPr sz="4600" dirty="0">
               <a:latin typeface="Arial"/>
               <a:cs typeface="Arial"/>
             </a:endParaRPr>
@@ -37412,7 +36984,7 @@
     </a:clrScheme>
     <a:fontScheme name="Office">
       <a:majorFont>
-        <a:latin typeface="Calibri Light" panose="020F0302020204030204"/>
+        <a:latin typeface="Calibri Light"/>
         <a:ea typeface=""/>
         <a:cs typeface=""/>
         <a:font script="Jpan" typeface="ＭＳ Ｐゴシック"/>
@@ -37447,7 +37019,7 @@
         <a:font script="Geor" typeface="Sylfaen"/>
       </a:majorFont>
       <a:minorFont>
-        <a:latin typeface="Calibri" panose="020F0502020204030204"/>
+        <a:latin typeface="Calibri"/>
         <a:ea typeface=""/>
         <a:cs typeface=""/>
         <a:font script="Jpan" typeface="ＭＳ Ｐゴシック"/>
@@ -37624,7 +37196,7 @@
   <a:extraClrSchemeLst/>
   <a:extLst>
     <a:ext uri="{05A4C25C-085E-4340-85A3-A5531E510DB2}">
-      <thm15:themeFamily xmlns:thm15="http://schemas.microsoft.com/office/thememl/2012/main" name="Office Theme" id="{62F939B6-93AF-4DB8-9C6B-D6C7DFDC589F}" vid="{4A3C46E8-61CC-4603-A589-7422A47A8E4A}"/>
+      <thm15:themeFamily xmlns:thm15="http://schemas.microsoft.com/office/thememl/2012/main" xmlns="" name="Office Theme" id="{62F939B6-93AF-4DB8-9C6B-D6C7DFDC589F}" vid="{4A3C46E8-61CC-4603-A589-7422A47A8E4A}"/>
     </a:ext>
   </a:extLst>
 </a:theme>

</xml_diff>